<commit_message>
add book info page
</commit_message>
<xml_diff>
--- a/Library.pptx
+++ b/Library.pptx
@@ -110,6 +110,11 @@
       </a:defRPr>
     </a:lvl9pPr>
   </p:defaultTextStyle>
+  <p:extLst>
+    <p:ext uri="{EFAFB233-063F-42B5-8137-9DF3F51BA10A}">
+      <p15:sldGuideLst xmlns:p15="http://schemas.microsoft.com/office/powerpoint/2012/main"/>
+    </p:ext>
+  </p:extLst>
 </p:presentation>
 </file>
 
@@ -3848,10 +3853,18 @@
           <a:lstStyle/>
           <a:p>
             <a:r>
-              <a:rPr lang="en-US" dirty="0"/>
+              <a:rPr lang="en-US" dirty="0">
+                <a:highlight>
+                  <a:srgbClr val="FF0000"/>
+                </a:highlight>
+              </a:rPr>
               <a:t>My mentor</a:t>
             </a:r>
-            <a:endParaRPr lang="ru-RU" dirty="0"/>
+            <a:endParaRPr lang="ru-RU" dirty="0">
+              <a:highlight>
+                <a:srgbClr val="FF0000"/>
+              </a:highlight>
+            </a:endParaRPr>
           </a:p>
         </p:txBody>
       </p:sp>
@@ -4193,7 +4206,7 @@
         <p:spPr>
           <a:xfrm>
             <a:off x="335560" y="1124676"/>
-            <a:ext cx="7652095" cy="1477328"/>
+            <a:ext cx="7652095" cy="1754326"/>
           </a:xfrm>
           <a:prstGeom prst="rect">
             <a:avLst/>
@@ -4249,6 +4262,22 @@
                 <a:latin typeface="Söhne"/>
               </a:rPr>
               <a:t>view books catalog</a:t>
+            </a:r>
+          </a:p>
+          <a:p>
+            <a:pPr marL="285750" indent="-285750">
+              <a:buFont typeface="Arial" panose="020B0604020202020204" pitchFamily="34" charset="0"/>
+              <a:buChar char="•"/>
+            </a:pPr>
+            <a:r>
+              <a:rPr lang="en-US" b="0" i="0" dirty="0">
+                <a:solidFill>
+                  <a:srgbClr val="374151"/>
+                </a:solidFill>
+                <a:effectLst/>
+                <a:latin typeface="Söhne"/>
+              </a:rPr>
+              <a:t>view book description</a:t>
             </a:r>
           </a:p>
           <a:p>
@@ -4555,7 +4584,7 @@
         </p:nvSpPr>
         <p:spPr>
           <a:xfrm>
-            <a:off x="335560" y="3768938"/>
+            <a:off x="335560" y="3819272"/>
             <a:ext cx="5559407" cy="2585323"/>
           </a:xfrm>
           <a:prstGeom prst="rect">
@@ -4888,8 +4917,8 @@
         </p:nvSpPr>
         <p:spPr>
           <a:xfrm>
-            <a:off x="335560" y="906562"/>
-            <a:ext cx="8949566" cy="3416320"/>
+            <a:off x="335560" y="847839"/>
+            <a:ext cx="8949566" cy="3693319"/>
           </a:xfrm>
           <a:prstGeom prst="rect">
             <a:avLst/>
@@ -4995,7 +5024,7 @@
                 <a:effectLst/>
                 <a:latin typeface="Söhne"/>
               </a:rPr>
-              <a:t>view a list of reader’s orders and a list of readers and their subscriptions</a:t>
+              <a:t>view a list of reader’s orders and a list of readers with their subscriptions</a:t>
             </a:r>
           </a:p>
           <a:p>
@@ -5169,6 +5198,28 @@
               </a:rPr>
               <a:t>view account with my registration information</a:t>
             </a:r>
+          </a:p>
+          <a:p>
+            <a:pPr marL="285750" indent="-285750">
+              <a:buFont typeface="Arial" panose="020B0604020202020204" pitchFamily="34" charset="0"/>
+              <a:buChar char="•"/>
+            </a:pPr>
+            <a:r>
+              <a:rPr lang="en-US" dirty="0">
+                <a:solidFill>
+                  <a:srgbClr val="374151"/>
+                </a:solidFill>
+                <a:latin typeface="Söhne"/>
+              </a:rPr>
+              <a:t>view information about readers</a:t>
+            </a:r>
+            <a:endParaRPr lang="en-US" b="0" i="0" dirty="0">
+              <a:solidFill>
+                <a:srgbClr val="374151"/>
+              </a:solidFill>
+              <a:effectLst/>
+              <a:latin typeface="Söhne"/>
+            </a:endParaRPr>
           </a:p>
           <a:p>
             <a:pPr marL="285750" indent="-285750">

</xml_diff>

<commit_message>
add rating for books
</commit_message>
<xml_diff>
--- a/Library.pptx
+++ b/Library.pptx
@@ -344,7 +344,7 @@
           <a:p>
             <a:fld id="{5A069CB8-F204-4D06-B913-C5A26A89888A}" type="datetimeFigureOut">
               <a:rPr lang="en-US" dirty="0"/>
-              <a:t>4/25/2023</a:t>
+              <a:t>4/28/2023</a:t>
             </a:fld>
             <a:endParaRPr lang="en-US" dirty="0"/>
           </a:p>
@@ -547,7 +547,7 @@
           <a:p>
             <a:fld id="{50B6E300-0A13-4A81-945A-7333C271A069}" type="datetimeFigureOut">
               <a:rPr lang="en-US" dirty="0"/>
-              <a:t>4/25/2023</a:t>
+              <a:t>4/28/2023</a:t>
             </a:fld>
             <a:endParaRPr lang="en-US" dirty="0"/>
           </a:p>
@@ -798,7 +798,7 @@
           <a:p>
             <a:fld id="{34671962-1EA4-46E7-BCB0-F36CE46D1A59}" type="datetimeFigureOut">
               <a:rPr lang="en-US" dirty="0"/>
-              <a:t>4/25/2023</a:t>
+              <a:t>4/28/2023</a:t>
             </a:fld>
             <a:endParaRPr lang="en-US" dirty="0"/>
           </a:p>
@@ -963,7 +963,7 @@
           <a:p>
             <a:fld id="{D30BB376-B19C-488D-ABEB-03C7E6E9E3E0}" type="datetimeFigureOut">
               <a:rPr lang="en-US" dirty="0"/>
-              <a:t>4/25/2023</a:t>
+              <a:t>4/28/2023</a:t>
             </a:fld>
             <a:endParaRPr lang="en-US" dirty="0"/>
           </a:p>
@@ -1301,7 +1301,7 @@
           <a:p>
             <a:fld id="{486F077B-A50F-4D64-8574-E2D6A98A5553}" type="datetimeFigureOut">
               <a:rPr lang="en-US" dirty="0"/>
-              <a:t>4/25/2023</a:t>
+              <a:t>4/28/2023</a:t>
             </a:fld>
             <a:endParaRPr lang="en-US" dirty="0"/>
           </a:p>
@@ -1571,7 +1571,7 @@
           <a:p>
             <a:fld id="{7D9E2A62-1983-43A1-A163-D8AA46534C80}" type="datetimeFigureOut">
               <a:rPr lang="en-US" dirty="0"/>
-              <a:t>4/25/2023</a:t>
+              <a:t>4/28/2023</a:t>
             </a:fld>
             <a:endParaRPr lang="en-US" dirty="0"/>
           </a:p>
@@ -1945,7 +1945,7 @@
           <a:p>
             <a:fld id="{898F3E3B-34E3-4345-B2A1-994B83598A9C}" type="datetimeFigureOut">
               <a:rPr lang="en-US" dirty="0"/>
-              <a:t>4/25/2023</a:t>
+              <a:t>4/28/2023</a:t>
             </a:fld>
             <a:endParaRPr lang="en-US" dirty="0"/>
           </a:p>
@@ -2058,7 +2058,7 @@
           <a:p>
             <a:fld id="{FD816C96-82A1-4D77-8ADA-627AC6FE3D65}" type="datetimeFigureOut">
               <a:rPr lang="en-US" dirty="0"/>
-              <a:t>4/25/2023</a:t>
+              <a:t>4/28/2023</a:t>
             </a:fld>
             <a:endParaRPr lang="en-US" dirty="0"/>
           </a:p>
@@ -2224,7 +2224,7 @@
           <a:p>
             <a:fld id="{1D102C1E-28F2-47E9-802D-339E64E2F920}" type="datetimeFigureOut">
               <a:rPr lang="en-US" dirty="0"/>
-              <a:t>4/25/2023</a:t>
+              <a:t>4/28/2023</a:t>
             </a:fld>
             <a:endParaRPr lang="en-US" dirty="0"/>
           </a:p>
@@ -2574,7 +2574,7 @@
           <a:p>
             <a:fld id="{24271A48-F18A-45B3-BC05-1E27DA3F88AF}" type="datetimeFigureOut">
               <a:rPr lang="en-US" dirty="0"/>
-              <a:t>4/25/2023</a:t>
+              <a:t>4/28/2023</a:t>
             </a:fld>
             <a:endParaRPr lang="en-US" dirty="0"/>
           </a:p>
@@ -2947,7 +2947,7 @@
           <a:p>
             <a:fld id="{65B747F8-9654-4282-85D2-65F41AAE7A75}" type="datetimeFigureOut">
               <a:rPr lang="en-US" dirty="0"/>
-              <a:t>4/25/2023</a:t>
+              <a:t>4/28/2023</a:t>
             </a:fld>
             <a:endParaRPr lang="en-US" dirty="0"/>
           </a:p>
@@ -3229,7 +3229,7 @@
           <a:p>
             <a:fld id="{5DC5B261-8843-42D1-AAFC-05E20E2D9B97}" type="datetimeFigureOut">
               <a:rPr lang="en-US" dirty="0"/>
-              <a:t>4/25/2023</a:t>
+              <a:t>4/28/2023</a:t>
             </a:fld>
             <a:endParaRPr lang="en-US" dirty="0"/>
           </a:p>
@@ -4020,7 +4020,7 @@
         </p:nvSpPr>
         <p:spPr>
           <a:xfrm>
-            <a:off x="335560" y="2736228"/>
+            <a:off x="335560" y="2602004"/>
             <a:ext cx="5241884" cy="1477328"/>
           </a:xfrm>
           <a:prstGeom prst="rect">
@@ -4205,8 +4205,8 @@
         </p:nvSpPr>
         <p:spPr>
           <a:xfrm>
-            <a:off x="335560" y="1124676"/>
-            <a:ext cx="7652095" cy="1754326"/>
+            <a:off x="335560" y="1040786"/>
+            <a:ext cx="8249566" cy="1754326"/>
           </a:xfrm>
           <a:prstGeom prst="rect">
             <a:avLst/>
@@ -4315,7 +4315,7 @@
                 <a:effectLst/>
                 <a:latin typeface="Söhne"/>
               </a:rPr>
-              <a:t>sort books in the catalog by name, author, publication, or date of publication</a:t>
+              <a:t>sort books in the catalog by name, author, rating, publication, or date of publication</a:t>
             </a:r>
           </a:p>
           <a:p>
@@ -4337,8 +4337,8 @@
         </p:nvSpPr>
         <p:spPr>
           <a:xfrm>
-            <a:off x="335559" y="4322677"/>
-            <a:ext cx="8910131" cy="2308324"/>
+            <a:off x="335559" y="4045840"/>
+            <a:ext cx="8572988" cy="2585323"/>
           </a:xfrm>
           <a:prstGeom prst="rect">
             <a:avLst/>
@@ -4468,6 +4468,22 @@
                 <a:latin typeface="Söhne"/>
               </a:rPr>
               <a:t> and the amount of the fine of them</a:t>
+            </a:r>
+          </a:p>
+          <a:p>
+            <a:pPr marL="285750" indent="-285750">
+              <a:buFont typeface="Arial" panose="020B0604020202020204" pitchFamily="34" charset="0"/>
+              <a:buChar char="•"/>
+            </a:pPr>
+            <a:r>
+              <a:rPr lang="en-US" b="0" i="0" dirty="0">
+                <a:solidFill>
+                  <a:srgbClr val="374151"/>
+                </a:solidFill>
+                <a:effectLst/>
+                <a:latin typeface="Söhne"/>
+              </a:rPr>
+              <a:t>set a rating for the books I've read</a:t>
             </a:r>
           </a:p>
           <a:p>

</xml_diff>

<commit_message>
add actuator with health status and metrics
</commit_message>
<xml_diff>
--- a/Library.pptx
+++ b/Library.pptx
@@ -344,7 +344,7 @@
           <a:p>
             <a:fld id="{5A069CB8-F204-4D06-B913-C5A26A89888A}" type="datetimeFigureOut">
               <a:rPr lang="en-US" dirty="0"/>
-              <a:t>4/28/2023</a:t>
+              <a:t>4/30/2023</a:t>
             </a:fld>
             <a:endParaRPr lang="en-US" dirty="0"/>
           </a:p>
@@ -547,7 +547,7 @@
           <a:p>
             <a:fld id="{50B6E300-0A13-4A81-945A-7333C271A069}" type="datetimeFigureOut">
               <a:rPr lang="en-US" dirty="0"/>
-              <a:t>4/28/2023</a:t>
+              <a:t>4/30/2023</a:t>
             </a:fld>
             <a:endParaRPr lang="en-US" dirty="0"/>
           </a:p>
@@ -798,7 +798,7 @@
           <a:p>
             <a:fld id="{34671962-1EA4-46E7-BCB0-F36CE46D1A59}" type="datetimeFigureOut">
               <a:rPr lang="en-US" dirty="0"/>
-              <a:t>4/28/2023</a:t>
+              <a:t>4/30/2023</a:t>
             </a:fld>
             <a:endParaRPr lang="en-US" dirty="0"/>
           </a:p>
@@ -963,7 +963,7 @@
           <a:p>
             <a:fld id="{D30BB376-B19C-488D-ABEB-03C7E6E9E3E0}" type="datetimeFigureOut">
               <a:rPr lang="en-US" dirty="0"/>
-              <a:t>4/28/2023</a:t>
+              <a:t>4/30/2023</a:t>
             </a:fld>
             <a:endParaRPr lang="en-US" dirty="0"/>
           </a:p>
@@ -1301,7 +1301,7 @@
           <a:p>
             <a:fld id="{486F077B-A50F-4D64-8574-E2D6A98A5553}" type="datetimeFigureOut">
               <a:rPr lang="en-US" dirty="0"/>
-              <a:t>4/28/2023</a:t>
+              <a:t>4/30/2023</a:t>
             </a:fld>
             <a:endParaRPr lang="en-US" dirty="0"/>
           </a:p>
@@ -1571,7 +1571,7 @@
           <a:p>
             <a:fld id="{7D9E2A62-1983-43A1-A163-D8AA46534C80}" type="datetimeFigureOut">
               <a:rPr lang="en-US" dirty="0"/>
-              <a:t>4/28/2023</a:t>
+              <a:t>4/30/2023</a:t>
             </a:fld>
             <a:endParaRPr lang="en-US" dirty="0"/>
           </a:p>
@@ -1945,7 +1945,7 @@
           <a:p>
             <a:fld id="{898F3E3B-34E3-4345-B2A1-994B83598A9C}" type="datetimeFigureOut">
               <a:rPr lang="en-US" dirty="0"/>
-              <a:t>4/28/2023</a:t>
+              <a:t>4/30/2023</a:t>
             </a:fld>
             <a:endParaRPr lang="en-US" dirty="0"/>
           </a:p>
@@ -2058,7 +2058,7 @@
           <a:p>
             <a:fld id="{FD816C96-82A1-4D77-8ADA-627AC6FE3D65}" type="datetimeFigureOut">
               <a:rPr lang="en-US" dirty="0"/>
-              <a:t>4/28/2023</a:t>
+              <a:t>4/30/2023</a:t>
             </a:fld>
             <a:endParaRPr lang="en-US" dirty="0"/>
           </a:p>
@@ -2224,7 +2224,7 @@
           <a:p>
             <a:fld id="{1D102C1E-28F2-47E9-802D-339E64E2F920}" type="datetimeFigureOut">
               <a:rPr lang="en-US" dirty="0"/>
-              <a:t>4/28/2023</a:t>
+              <a:t>4/30/2023</a:t>
             </a:fld>
             <a:endParaRPr lang="en-US" dirty="0"/>
           </a:p>
@@ -2574,7 +2574,7 @@
           <a:p>
             <a:fld id="{24271A48-F18A-45B3-BC05-1E27DA3F88AF}" type="datetimeFigureOut">
               <a:rPr lang="en-US" dirty="0"/>
-              <a:t>4/28/2023</a:t>
+              <a:t>4/30/2023</a:t>
             </a:fld>
             <a:endParaRPr lang="en-US" dirty="0"/>
           </a:p>
@@ -2947,7 +2947,7 @@
           <a:p>
             <a:fld id="{65B747F8-9654-4282-85D2-65F41AAE7A75}" type="datetimeFigureOut">
               <a:rPr lang="en-US" dirty="0"/>
-              <a:t>4/28/2023</a:t>
+              <a:t>4/30/2023</a:t>
             </a:fld>
             <a:endParaRPr lang="en-US" dirty="0"/>
           </a:p>
@@ -3229,7 +3229,7 @@
           <a:p>
             <a:fld id="{5DC5B261-8843-42D1-AAFC-05E20E2D9B97}" type="datetimeFigureOut">
               <a:rPr lang="en-US" dirty="0"/>
-              <a:t>4/28/2023</a:t>
+              <a:t>4/30/2023</a:t>
             </a:fld>
             <a:endParaRPr lang="en-US" dirty="0"/>
           </a:p>
@@ -6694,6 +6694,19 @@
             </a:r>
           </a:p>
           <a:p>
+            <a:pPr marL="742950" lvl="1" indent="-285750">
+              <a:lnSpc>
+                <a:spcPct val="150000"/>
+              </a:lnSpc>
+              <a:buFont typeface="Arial" panose="020B0604020202020204" pitchFamily="34" charset="0"/>
+              <a:buChar char="•"/>
+            </a:pPr>
+            <a:r>
+              <a:rPr lang="en-US" dirty="0"/>
+              <a:t>Actuator</a:t>
+            </a:r>
+          </a:p>
+          <a:p>
             <a:pPr marL="285750" indent="-285750">
               <a:lnSpc>
                 <a:spcPct val="150000"/>
@@ -6786,19 +6799,6 @@
               <a:t>JUnit &amp; Mockito</a:t>
             </a:r>
             <a:endParaRPr lang="ru-RU" dirty="0"/>
-          </a:p>
-          <a:p>
-            <a:pPr marL="285750" indent="-285750">
-              <a:lnSpc>
-                <a:spcPct val="150000"/>
-              </a:lnSpc>
-              <a:buFont typeface="Arial" panose="020B0604020202020204" pitchFamily="34" charset="0"/>
-              <a:buChar char="•"/>
-            </a:pPr>
-            <a:r>
-              <a:rPr lang="en-US" dirty="0"/>
-              <a:t>Maven</a:t>
-            </a:r>
           </a:p>
         </p:txBody>
       </p:sp>
@@ -6817,7 +6817,7 @@
         <p:spPr>
           <a:xfrm>
             <a:off x="4519497" y="1012722"/>
-            <a:ext cx="2901564" cy="1711366"/>
+            <a:ext cx="2901564" cy="2126864"/>
           </a:xfrm>
           <a:prstGeom prst="rect">
             <a:avLst/>
@@ -6840,6 +6840,19 @@
             <a:r>
               <a:rPr lang="en-US" dirty="0"/>
               <a:t>Lombok</a:t>
+            </a:r>
+          </a:p>
+          <a:p>
+            <a:pPr marL="285750" indent="-285750">
+              <a:lnSpc>
+                <a:spcPct val="150000"/>
+              </a:lnSpc>
+              <a:buFont typeface="Arial" panose="020B0604020202020204" pitchFamily="34" charset="0"/>
+              <a:buChar char="•"/>
+            </a:pPr>
+            <a:r>
+              <a:rPr lang="en-US" dirty="0"/>
+              <a:t>Maven</a:t>
             </a:r>
           </a:p>
           <a:p>
@@ -6956,10 +6969,10 @@
       </p:sp>
       <p:pic>
         <p:nvPicPr>
-          <p:cNvPr id="8" name="Рисунок 7">
+          <p:cNvPr id="4" name="Рисунок 3">
             <a:extLst>
               <a:ext uri="{FF2B5EF4-FFF2-40B4-BE49-F238E27FC236}">
-                <a16:creationId xmlns:a16="http://schemas.microsoft.com/office/drawing/2014/main" id="{4FE6D847-CA22-024E-FA35-5C39BDCF1167}"/>
+                <a16:creationId xmlns:a16="http://schemas.microsoft.com/office/drawing/2014/main" id="{FD049A76-5AA9-4D86-AF71-7F260DBD91A7}"/>
               </a:ext>
             </a:extLst>
           </p:cNvPr>
@@ -6976,8 +6989,8 @@
         </p:blipFill>
         <p:spPr>
           <a:xfrm>
-            <a:off x="266303" y="1012722"/>
-            <a:ext cx="4816243" cy="5178490"/>
+            <a:off x="642096" y="1012722"/>
+            <a:ext cx="6337203" cy="5173078"/>
           </a:xfrm>
           <a:prstGeom prst="rect">
             <a:avLst/>

</xml_diff>

<commit_message>
fix role presentation on root page
</commit_message>
<xml_diff>
--- a/Library.pptx
+++ b/Library.pptx
@@ -12,6 +12,7 @@
     <p:sldId id="260" r:id="rId6"/>
     <p:sldId id="261" r:id="rId7"/>
     <p:sldId id="262" r:id="rId8"/>
+    <p:sldId id="263" r:id="rId9"/>
   </p:sldIdLst>
   <p:sldSz cx="12192000" cy="6858000"/>
   <p:notesSz cx="6858000" cy="9144000"/>
@@ -344,7 +345,7 @@
           <a:p>
             <a:fld id="{5A069CB8-F204-4D06-B913-C5A26A89888A}" type="datetimeFigureOut">
               <a:rPr lang="en-US" dirty="0"/>
-              <a:t>4/30/2023</a:t>
+              <a:t>5/4/2023</a:t>
             </a:fld>
             <a:endParaRPr lang="en-US" dirty="0"/>
           </a:p>
@@ -547,7 +548,7 @@
           <a:p>
             <a:fld id="{50B6E300-0A13-4A81-945A-7333C271A069}" type="datetimeFigureOut">
               <a:rPr lang="en-US" dirty="0"/>
-              <a:t>4/30/2023</a:t>
+              <a:t>5/4/2023</a:t>
             </a:fld>
             <a:endParaRPr lang="en-US" dirty="0"/>
           </a:p>
@@ -798,7 +799,7 @@
           <a:p>
             <a:fld id="{34671962-1EA4-46E7-BCB0-F36CE46D1A59}" type="datetimeFigureOut">
               <a:rPr lang="en-US" dirty="0"/>
-              <a:t>4/30/2023</a:t>
+              <a:t>5/4/2023</a:t>
             </a:fld>
             <a:endParaRPr lang="en-US" dirty="0"/>
           </a:p>
@@ -963,7 +964,7 @@
           <a:p>
             <a:fld id="{D30BB376-B19C-488D-ABEB-03C7E6E9E3E0}" type="datetimeFigureOut">
               <a:rPr lang="en-US" dirty="0"/>
-              <a:t>4/30/2023</a:t>
+              <a:t>5/4/2023</a:t>
             </a:fld>
             <a:endParaRPr lang="en-US" dirty="0"/>
           </a:p>
@@ -1301,7 +1302,7 @@
           <a:p>
             <a:fld id="{486F077B-A50F-4D64-8574-E2D6A98A5553}" type="datetimeFigureOut">
               <a:rPr lang="en-US" dirty="0"/>
-              <a:t>4/30/2023</a:t>
+              <a:t>5/4/2023</a:t>
             </a:fld>
             <a:endParaRPr lang="en-US" dirty="0"/>
           </a:p>
@@ -1571,7 +1572,7 @@
           <a:p>
             <a:fld id="{7D9E2A62-1983-43A1-A163-D8AA46534C80}" type="datetimeFigureOut">
               <a:rPr lang="en-US" dirty="0"/>
-              <a:t>4/30/2023</a:t>
+              <a:t>5/4/2023</a:t>
             </a:fld>
             <a:endParaRPr lang="en-US" dirty="0"/>
           </a:p>
@@ -1945,7 +1946,7 @@
           <a:p>
             <a:fld id="{898F3E3B-34E3-4345-B2A1-994B83598A9C}" type="datetimeFigureOut">
               <a:rPr lang="en-US" dirty="0"/>
-              <a:t>4/30/2023</a:t>
+              <a:t>5/4/2023</a:t>
             </a:fld>
             <a:endParaRPr lang="en-US" dirty="0"/>
           </a:p>
@@ -2058,7 +2059,7 @@
           <a:p>
             <a:fld id="{FD816C96-82A1-4D77-8ADA-627AC6FE3D65}" type="datetimeFigureOut">
               <a:rPr lang="en-US" dirty="0"/>
-              <a:t>4/30/2023</a:t>
+              <a:t>5/4/2023</a:t>
             </a:fld>
             <a:endParaRPr lang="en-US" dirty="0"/>
           </a:p>
@@ -2224,7 +2225,7 @@
           <a:p>
             <a:fld id="{1D102C1E-28F2-47E9-802D-339E64E2F920}" type="datetimeFigureOut">
               <a:rPr lang="en-US" dirty="0"/>
-              <a:t>4/30/2023</a:t>
+              <a:t>5/4/2023</a:t>
             </a:fld>
             <a:endParaRPr lang="en-US" dirty="0"/>
           </a:p>
@@ -2574,7 +2575,7 @@
           <a:p>
             <a:fld id="{24271A48-F18A-45B3-BC05-1E27DA3F88AF}" type="datetimeFigureOut">
               <a:rPr lang="en-US" dirty="0"/>
-              <a:t>4/30/2023</a:t>
+              <a:t>5/4/2023</a:t>
             </a:fld>
             <a:endParaRPr lang="en-US" dirty="0"/>
           </a:p>
@@ -2947,7 +2948,7 @@
           <a:p>
             <a:fld id="{65B747F8-9654-4282-85D2-65F41AAE7A75}" type="datetimeFigureOut">
               <a:rPr lang="en-US" dirty="0"/>
-              <a:t>4/30/2023</a:t>
+              <a:t>5/4/2023</a:t>
             </a:fld>
             <a:endParaRPr lang="en-US" dirty="0"/>
           </a:p>
@@ -3229,7 +3230,7 @@
           <a:p>
             <a:fld id="{5DC5B261-8843-42D1-AAFC-05E20E2D9B97}" type="datetimeFigureOut">
               <a:rPr lang="en-US" dirty="0"/>
-              <a:t>4/30/2023</a:t>
+              <a:t>5/4/2023</a:t>
             </a:fld>
             <a:endParaRPr lang="en-US" dirty="0"/>
           </a:p>
@@ -7010,6 +7011,187 @@
 </p:sld>
 </file>
 
+<file path=ppt/slides/slide8.xml><?xml version="1.0" encoding="utf-8"?>
+<p:sld xmlns:a="http://schemas.openxmlformats.org/drawingml/2006/main" xmlns:r="http://schemas.openxmlformats.org/officeDocument/2006/relationships" xmlns:p="http://schemas.openxmlformats.org/presentationml/2006/main">
+  <p:cSld>
+    <p:spTree>
+      <p:nvGrpSpPr>
+        <p:cNvPr id="1" name=""/>
+        <p:cNvGrpSpPr/>
+        <p:nvPr/>
+      </p:nvGrpSpPr>
+      <p:grpSpPr>
+        <a:xfrm>
+          <a:off x="0" y="0"/>
+          <a:ext cx="0" cy="0"/>
+          <a:chOff x="0" y="0"/>
+          <a:chExt cx="0" cy="0"/>
+        </a:xfrm>
+      </p:grpSpPr>
+      <p:pic>
+        <p:nvPicPr>
+          <p:cNvPr id="3" name="Рисунок 2">
+            <a:extLst>
+              <a:ext uri="{FF2B5EF4-FFF2-40B4-BE49-F238E27FC236}">
+                <a16:creationId xmlns:a16="http://schemas.microsoft.com/office/drawing/2014/main" id="{B01FBD06-3442-2B49-FC58-6649A33422BC}"/>
+              </a:ext>
+            </a:extLst>
+          </p:cNvPr>
+          <p:cNvPicPr>
+            <a:picLocks noChangeAspect="1"/>
+          </p:cNvPicPr>
+          <p:nvPr/>
+        </p:nvPicPr>
+        <p:blipFill>
+          <a:blip r:embed="rId2"/>
+          <a:stretch>
+            <a:fillRect/>
+          </a:stretch>
+        </p:blipFill>
+        <p:spPr>
+          <a:xfrm>
+            <a:off x="4842864" y="172967"/>
+            <a:ext cx="7159133" cy="5938584"/>
+          </a:xfrm>
+          <a:prstGeom prst="rect">
+            <a:avLst/>
+          </a:prstGeom>
+        </p:spPr>
+      </p:pic>
+      <p:sp>
+        <p:nvSpPr>
+          <p:cNvPr id="4" name="TextBox 3">
+            <a:extLst>
+              <a:ext uri="{FF2B5EF4-FFF2-40B4-BE49-F238E27FC236}">
+                <a16:creationId xmlns:a16="http://schemas.microsoft.com/office/drawing/2014/main" id="{0B8C53C7-606B-F2C8-0D28-35A3D7B53614}"/>
+              </a:ext>
+            </a:extLst>
+          </p:cNvPr>
+          <p:cNvSpPr txBox="1"/>
+          <p:nvPr/>
+        </p:nvSpPr>
+        <p:spPr>
+          <a:xfrm>
+            <a:off x="335560" y="243281"/>
+            <a:ext cx="3281219" cy="769441"/>
+          </a:xfrm>
+          <a:prstGeom prst="rect">
+            <a:avLst/>
+          </a:prstGeom>
+          <a:noFill/>
+        </p:spPr>
+        <p:txBody>
+          <a:bodyPr wrap="none" rtlCol="0">
+            <a:spAutoFit/>
+          </a:bodyPr>
+          <a:lstStyle/>
+          <a:p>
+            <a:r>
+              <a:rPr lang="en-US" sz="4400" dirty="0"/>
+              <a:t>Test coverage</a:t>
+            </a:r>
+            <a:endParaRPr lang="ru-RU" sz="4400" dirty="0"/>
+          </a:p>
+        </p:txBody>
+      </p:sp>
+      <p:sp>
+        <p:nvSpPr>
+          <p:cNvPr id="7" name="TextBox 6">
+            <a:extLst>
+              <a:ext uri="{FF2B5EF4-FFF2-40B4-BE49-F238E27FC236}">
+                <a16:creationId xmlns:a16="http://schemas.microsoft.com/office/drawing/2014/main" id="{437E3AB7-E4BE-5FF3-B66F-CCD104955D37}"/>
+              </a:ext>
+            </a:extLst>
+          </p:cNvPr>
+          <p:cNvSpPr txBox="1"/>
+          <p:nvPr/>
+        </p:nvSpPr>
+        <p:spPr>
+          <a:xfrm>
+            <a:off x="190003" y="1012722"/>
+            <a:ext cx="3742243" cy="1477328"/>
+          </a:xfrm>
+          <a:prstGeom prst="rect">
+            <a:avLst/>
+          </a:prstGeom>
+          <a:noFill/>
+        </p:spPr>
+        <p:txBody>
+          <a:bodyPr wrap="none" rtlCol="0">
+            <a:spAutoFit/>
+          </a:bodyPr>
+          <a:lstStyle/>
+          <a:p>
+            <a:pPr marL="285750" indent="-285750">
+              <a:buFont typeface="Arial" panose="020B0604020202020204" pitchFamily="34" charset="0"/>
+              <a:buChar char="•"/>
+            </a:pPr>
+            <a:r>
+              <a:rPr lang="en-US" dirty="0"/>
+              <a:t>Project code-line coverage 82%</a:t>
+            </a:r>
+          </a:p>
+          <a:p>
+            <a:pPr marL="285750" indent="-285750">
+              <a:buFont typeface="Arial" panose="020B0604020202020204" pitchFamily="34" charset="0"/>
+              <a:buChar char="•"/>
+            </a:pPr>
+            <a:r>
+              <a:rPr lang="en-US" dirty="0"/>
+              <a:t>Unit tests JUnit 5 + Mockito</a:t>
+            </a:r>
+          </a:p>
+          <a:p>
+            <a:pPr marL="285750" indent="-285750">
+              <a:buFont typeface="Arial" panose="020B0604020202020204" pitchFamily="34" charset="0"/>
+              <a:buChar char="•"/>
+            </a:pPr>
+            <a:r>
+              <a:rPr lang="en-US" dirty="0"/>
+              <a:t>Integration tests </a:t>
+            </a:r>
+          </a:p>
+          <a:p>
+            <a:pPr marL="742950" lvl="1" indent="-285750">
+              <a:buFont typeface="Arial" panose="020B0604020202020204" pitchFamily="34" charset="0"/>
+              <a:buChar char="•"/>
+            </a:pPr>
+            <a:r>
+              <a:rPr lang="en-US" dirty="0"/>
+              <a:t>@SpringBootTest + </a:t>
+            </a:r>
+            <a:r>
+              <a:rPr lang="en-US" dirty="0" err="1"/>
+              <a:t>MockMVC</a:t>
+            </a:r>
+            <a:endParaRPr lang="en-US" dirty="0"/>
+          </a:p>
+          <a:p>
+            <a:pPr marL="742950" lvl="1" indent="-285750">
+              <a:buFont typeface="Arial" panose="020B0604020202020204" pitchFamily="34" charset="0"/>
+              <a:buChar char="•"/>
+            </a:pPr>
+            <a:r>
+              <a:rPr lang="en-US" dirty="0" err="1"/>
+              <a:t>RESTClient</a:t>
+            </a:r>
+            <a:endParaRPr lang="ru-RU" dirty="0"/>
+          </a:p>
+        </p:txBody>
+      </p:sp>
+    </p:spTree>
+    <p:extLst>
+      <p:ext uri="{BB962C8B-B14F-4D97-AF65-F5344CB8AC3E}">
+        <p14:creationId xmlns:p14="http://schemas.microsoft.com/office/powerpoint/2010/main" val="3328565548"/>
+      </p:ext>
+    </p:extLst>
+  </p:cSld>
+  <p:clrMapOvr>
+    <a:masterClrMapping/>
+  </p:clrMapOvr>
+</p:sld>
+</file>
+
 <file path=ppt/theme/theme1.xml><?xml version="1.0" encoding="utf-8"?>
 <a:theme xmlns:a="http://schemas.openxmlformats.org/drawingml/2006/main" name="Ретро">
   <a:themeElements>

</xml_diff>

<commit_message>
add swagger for Rest-endpoint
</commit_message>
<xml_diff>
--- a/Library.pptx
+++ b/Library.pptx
@@ -14,6 +14,7 @@
     <p:sldId id="262" r:id="rId8"/>
     <p:sldId id="263" r:id="rId9"/>
     <p:sldId id="264" r:id="rId10"/>
+    <p:sldId id="265" r:id="rId11"/>
   </p:sldIdLst>
   <p:sldSz cx="12192000" cy="6858000"/>
   <p:notesSz cx="6858000" cy="9144000"/>
@@ -346,7 +347,7 @@
           <a:p>
             <a:fld id="{5A069CB8-F204-4D06-B913-C5A26A89888A}" type="datetimeFigureOut">
               <a:rPr lang="en-US" dirty="0"/>
-              <a:t>5/10/2023</a:t>
+              <a:t>5/18/2023</a:t>
             </a:fld>
             <a:endParaRPr lang="en-US" dirty="0"/>
           </a:p>
@@ -549,7 +550,7 @@
           <a:p>
             <a:fld id="{50B6E300-0A13-4A81-945A-7333C271A069}" type="datetimeFigureOut">
               <a:rPr lang="en-US" dirty="0"/>
-              <a:t>5/10/2023</a:t>
+              <a:t>5/18/2023</a:t>
             </a:fld>
             <a:endParaRPr lang="en-US" dirty="0"/>
           </a:p>
@@ -800,7 +801,7 @@
           <a:p>
             <a:fld id="{34671962-1EA4-46E7-BCB0-F36CE46D1A59}" type="datetimeFigureOut">
               <a:rPr lang="en-US" dirty="0"/>
-              <a:t>5/10/2023</a:t>
+              <a:t>5/18/2023</a:t>
             </a:fld>
             <a:endParaRPr lang="en-US" dirty="0"/>
           </a:p>
@@ -965,7 +966,7 @@
           <a:p>
             <a:fld id="{D30BB376-B19C-488D-ABEB-03C7E6E9E3E0}" type="datetimeFigureOut">
               <a:rPr lang="en-US" dirty="0"/>
-              <a:t>5/10/2023</a:t>
+              <a:t>5/18/2023</a:t>
             </a:fld>
             <a:endParaRPr lang="en-US" dirty="0"/>
           </a:p>
@@ -1303,7 +1304,7 @@
           <a:p>
             <a:fld id="{486F077B-A50F-4D64-8574-E2D6A98A5553}" type="datetimeFigureOut">
               <a:rPr lang="en-US" dirty="0"/>
-              <a:t>5/10/2023</a:t>
+              <a:t>5/18/2023</a:t>
             </a:fld>
             <a:endParaRPr lang="en-US" dirty="0"/>
           </a:p>
@@ -1573,7 +1574,7 @@
           <a:p>
             <a:fld id="{7D9E2A62-1983-43A1-A163-D8AA46534C80}" type="datetimeFigureOut">
               <a:rPr lang="en-US" dirty="0"/>
-              <a:t>5/10/2023</a:t>
+              <a:t>5/18/2023</a:t>
             </a:fld>
             <a:endParaRPr lang="en-US" dirty="0"/>
           </a:p>
@@ -1947,7 +1948,7 @@
           <a:p>
             <a:fld id="{898F3E3B-34E3-4345-B2A1-994B83598A9C}" type="datetimeFigureOut">
               <a:rPr lang="en-US" dirty="0"/>
-              <a:t>5/10/2023</a:t>
+              <a:t>5/18/2023</a:t>
             </a:fld>
             <a:endParaRPr lang="en-US" dirty="0"/>
           </a:p>
@@ -2060,7 +2061,7 @@
           <a:p>
             <a:fld id="{FD816C96-82A1-4D77-8ADA-627AC6FE3D65}" type="datetimeFigureOut">
               <a:rPr lang="en-US" dirty="0"/>
-              <a:t>5/10/2023</a:t>
+              <a:t>5/18/2023</a:t>
             </a:fld>
             <a:endParaRPr lang="en-US" dirty="0"/>
           </a:p>
@@ -2226,7 +2227,7 @@
           <a:p>
             <a:fld id="{1D102C1E-28F2-47E9-802D-339E64E2F920}" type="datetimeFigureOut">
               <a:rPr lang="en-US" dirty="0"/>
-              <a:t>5/10/2023</a:t>
+              <a:t>5/18/2023</a:t>
             </a:fld>
             <a:endParaRPr lang="en-US" dirty="0"/>
           </a:p>
@@ -2576,7 +2577,7 @@
           <a:p>
             <a:fld id="{24271A48-F18A-45B3-BC05-1E27DA3F88AF}" type="datetimeFigureOut">
               <a:rPr lang="en-US" dirty="0"/>
-              <a:t>5/10/2023</a:t>
+              <a:t>5/18/2023</a:t>
             </a:fld>
             <a:endParaRPr lang="en-US" dirty="0"/>
           </a:p>
@@ -2949,7 +2950,7 @@
           <a:p>
             <a:fld id="{65B747F8-9654-4282-85D2-65F41AAE7A75}" type="datetimeFigureOut">
               <a:rPr lang="en-US" dirty="0"/>
-              <a:t>5/10/2023</a:t>
+              <a:t>5/18/2023</a:t>
             </a:fld>
             <a:endParaRPr lang="en-US" dirty="0"/>
           </a:p>
@@ -3231,7 +3232,7 @@
           <a:p>
             <a:fld id="{5DC5B261-8843-42D1-AAFC-05E20E2D9B97}" type="datetimeFigureOut">
               <a:rPr lang="en-US" dirty="0"/>
-              <a:t>5/10/2023</a:t>
+              <a:t>5/18/2023</a:t>
             </a:fld>
             <a:endParaRPr lang="en-US" dirty="0"/>
           </a:p>
@@ -3828,50 +3829,6 @@
       </p:sp>
       <p:sp>
         <p:nvSpPr>
-          <p:cNvPr id="4" name="TextBox 3">
-            <a:extLst>
-              <a:ext uri="{FF2B5EF4-FFF2-40B4-BE49-F238E27FC236}">
-                <a16:creationId xmlns:a16="http://schemas.microsoft.com/office/drawing/2014/main" id="{2E433AE3-3CE6-6A97-DFEE-B78A2A82CC2C}"/>
-              </a:ext>
-            </a:extLst>
-          </p:cNvPr>
-          <p:cNvSpPr txBox="1"/>
-          <p:nvPr/>
-        </p:nvSpPr>
-        <p:spPr>
-          <a:xfrm>
-            <a:off x="9789952" y="335560"/>
-            <a:ext cx="1235082" cy="369332"/>
-          </a:xfrm>
-          <a:prstGeom prst="rect">
-            <a:avLst/>
-          </a:prstGeom>
-          <a:noFill/>
-        </p:spPr>
-        <p:txBody>
-          <a:bodyPr wrap="none" rtlCol="0">
-            <a:spAutoFit/>
-          </a:bodyPr>
-          <a:lstStyle/>
-          <a:p>
-            <a:r>
-              <a:rPr lang="en-US" dirty="0">
-                <a:highlight>
-                  <a:srgbClr val="FF0000"/>
-                </a:highlight>
-              </a:rPr>
-              <a:t>My mentor</a:t>
-            </a:r>
-            <a:endParaRPr lang="ru-RU" dirty="0">
-              <a:highlight>
-                <a:srgbClr val="FF0000"/>
-              </a:highlight>
-            </a:endParaRPr>
-          </a:p>
-        </p:txBody>
-      </p:sp>
-      <p:sp>
-        <p:nvSpPr>
           <p:cNvPr id="5" name="TextBox 4">
             <a:extLst>
               <a:ext uri="{FF2B5EF4-FFF2-40B4-BE49-F238E27FC236}">
@@ -3946,6 +3903,72 @@
     <p:extLst>
       <p:ext uri="{BB962C8B-B14F-4D97-AF65-F5344CB8AC3E}">
         <p14:creationId xmlns:p14="http://schemas.microsoft.com/office/powerpoint/2010/main" val="1362931165"/>
+      </p:ext>
+    </p:extLst>
+  </p:cSld>
+  <p:clrMapOvr>
+    <a:masterClrMapping/>
+  </p:clrMapOvr>
+</p:sld>
+</file>
+
+<file path=ppt/slides/slide10.xml><?xml version="1.0" encoding="utf-8"?>
+<p:sld xmlns:a="http://schemas.openxmlformats.org/drawingml/2006/main" xmlns:r="http://schemas.openxmlformats.org/officeDocument/2006/relationships" xmlns:p="http://schemas.openxmlformats.org/presentationml/2006/main">
+  <p:cSld>
+    <p:spTree>
+      <p:nvGrpSpPr>
+        <p:cNvPr id="1" name=""/>
+        <p:cNvGrpSpPr/>
+        <p:nvPr/>
+      </p:nvGrpSpPr>
+      <p:grpSpPr>
+        <a:xfrm>
+          <a:off x="0" y="0"/>
+          <a:ext cx="0" cy="0"/>
+          <a:chOff x="0" y="0"/>
+          <a:chExt cx="0" cy="0"/>
+        </a:xfrm>
+      </p:grpSpPr>
+      <p:sp>
+        <p:nvSpPr>
+          <p:cNvPr id="2" name="TextBox 1">
+            <a:extLst>
+              <a:ext uri="{FF2B5EF4-FFF2-40B4-BE49-F238E27FC236}">
+                <a16:creationId xmlns:a16="http://schemas.microsoft.com/office/drawing/2014/main" id="{7FAB1A7F-1F52-5E30-7A8D-E8538279D410}"/>
+              </a:ext>
+            </a:extLst>
+          </p:cNvPr>
+          <p:cNvSpPr txBox="1"/>
+          <p:nvPr/>
+        </p:nvSpPr>
+        <p:spPr>
+          <a:xfrm>
+            <a:off x="335560" y="243281"/>
+            <a:ext cx="4645246" cy="769441"/>
+          </a:xfrm>
+          <a:prstGeom prst="rect">
+            <a:avLst/>
+          </a:prstGeom>
+          <a:noFill/>
+        </p:spPr>
+        <p:txBody>
+          <a:bodyPr wrap="none" rtlCol="0">
+            <a:spAutoFit/>
+          </a:bodyPr>
+          <a:lstStyle/>
+          <a:p>
+            <a:r>
+              <a:rPr lang="en-US" sz="4400" dirty="0"/>
+              <a:t>Interesting features</a:t>
+            </a:r>
+            <a:endParaRPr lang="ru-RU" sz="4400" dirty="0"/>
+          </a:p>
+        </p:txBody>
+      </p:sp>
+    </p:spTree>
+    <p:extLst>
+      <p:ext uri="{BB962C8B-B14F-4D97-AF65-F5344CB8AC3E}">
+        <p14:creationId xmlns:p14="http://schemas.microsoft.com/office/powerpoint/2010/main" val="555461465"/>
       </p:ext>
     </p:extLst>
   </p:cSld>
@@ -6819,7 +6842,7 @@
         <p:spPr>
           <a:xfrm>
             <a:off x="4519497" y="1012722"/>
-            <a:ext cx="2901564" cy="2126864"/>
+            <a:ext cx="2848665" cy="2542363"/>
           </a:xfrm>
           <a:prstGeom prst="rect">
             <a:avLst/>
@@ -6898,7 +6921,29 @@
             </a:r>
             <a:r>
               <a:rPr lang="en-US" dirty="0"/>
-              <a:t> password encoder </a:t>
+              <a:t> password encoder</a:t>
+            </a:r>
+            <a:endParaRPr lang="ru-RU" dirty="0"/>
+          </a:p>
+          <a:p>
+            <a:pPr marL="285750" indent="-285750">
+              <a:lnSpc>
+                <a:spcPct val="150000"/>
+              </a:lnSpc>
+              <a:buFont typeface="Arial" panose="020B0604020202020204" pitchFamily="34" charset="0"/>
+              <a:buChar char="•"/>
+            </a:pPr>
+            <a:r>
+              <a:rPr lang="en-US" dirty="0"/>
+              <a:t>Swagger (</a:t>
+            </a:r>
+            <a:r>
+              <a:rPr lang="en-US" dirty="0" err="1"/>
+              <a:t>OpenAPI</a:t>
+            </a:r>
+            <a:r>
+              <a:rPr lang="en-US" dirty="0"/>
+              <a:t> 3.0)</a:t>
             </a:r>
           </a:p>
         </p:txBody>
@@ -7153,6 +7198,16 @@
             </a:r>
           </a:p>
           <a:p>
+            <a:pPr marL="285750" indent="-285750">
+              <a:buFont typeface="Arial" panose="020B0604020202020204" pitchFamily="34" charset="0"/>
+              <a:buChar char="•"/>
+            </a:pPr>
+            <a:r>
+              <a:rPr lang="en-US" dirty="0"/>
+              <a:t>End-to-End tests</a:t>
+            </a:r>
+          </a:p>
+          <a:p>
             <a:pPr marL="742950" lvl="1" indent="-285750">
               <a:buFont typeface="Arial" panose="020B0604020202020204" pitchFamily="34" charset="0"/>
               <a:buChar char="•"/>
@@ -7166,17 +7221,6 @@
               <a:t>MockMVC</a:t>
             </a:r>
             <a:endParaRPr lang="en-US" dirty="0"/>
-          </a:p>
-          <a:p>
-            <a:pPr marL="742950" lvl="1" indent="-285750">
-              <a:buFont typeface="Arial" panose="020B0604020202020204" pitchFamily="34" charset="0"/>
-              <a:buChar char="•"/>
-            </a:pPr>
-            <a:r>
-              <a:rPr lang="en-US" dirty="0" err="1"/>
-              <a:t>RESTClient</a:t>
-            </a:r>
-            <a:endParaRPr lang="ru-RU" dirty="0"/>
           </a:p>
         </p:txBody>
       </p:sp>

</xml_diff>

<commit_message>
add features to Library.pptx
</commit_message>
<xml_diff>
--- a/Library.pptx
+++ b/Library.pptx
@@ -347,7 +347,7 @@
           <a:p>
             <a:fld id="{5A069CB8-F204-4D06-B913-C5A26A89888A}" type="datetimeFigureOut">
               <a:rPr lang="en-US" dirty="0"/>
-              <a:t>5/18/2023</a:t>
+              <a:t>5/19/2023</a:t>
             </a:fld>
             <a:endParaRPr lang="en-US" dirty="0"/>
           </a:p>
@@ -550,7 +550,7 @@
           <a:p>
             <a:fld id="{50B6E300-0A13-4A81-945A-7333C271A069}" type="datetimeFigureOut">
               <a:rPr lang="en-US" dirty="0"/>
-              <a:t>5/18/2023</a:t>
+              <a:t>5/19/2023</a:t>
             </a:fld>
             <a:endParaRPr lang="en-US" dirty="0"/>
           </a:p>
@@ -801,7 +801,7 @@
           <a:p>
             <a:fld id="{34671962-1EA4-46E7-BCB0-F36CE46D1A59}" type="datetimeFigureOut">
               <a:rPr lang="en-US" dirty="0"/>
-              <a:t>5/18/2023</a:t>
+              <a:t>5/19/2023</a:t>
             </a:fld>
             <a:endParaRPr lang="en-US" dirty="0"/>
           </a:p>
@@ -966,7 +966,7 @@
           <a:p>
             <a:fld id="{D30BB376-B19C-488D-ABEB-03C7E6E9E3E0}" type="datetimeFigureOut">
               <a:rPr lang="en-US" dirty="0"/>
-              <a:t>5/18/2023</a:t>
+              <a:t>5/19/2023</a:t>
             </a:fld>
             <a:endParaRPr lang="en-US" dirty="0"/>
           </a:p>
@@ -1304,7 +1304,7 @@
           <a:p>
             <a:fld id="{486F077B-A50F-4D64-8574-E2D6A98A5553}" type="datetimeFigureOut">
               <a:rPr lang="en-US" dirty="0"/>
-              <a:t>5/18/2023</a:t>
+              <a:t>5/19/2023</a:t>
             </a:fld>
             <a:endParaRPr lang="en-US" dirty="0"/>
           </a:p>
@@ -1574,7 +1574,7 @@
           <a:p>
             <a:fld id="{7D9E2A62-1983-43A1-A163-D8AA46534C80}" type="datetimeFigureOut">
               <a:rPr lang="en-US" dirty="0"/>
-              <a:t>5/18/2023</a:t>
+              <a:t>5/19/2023</a:t>
             </a:fld>
             <a:endParaRPr lang="en-US" dirty="0"/>
           </a:p>
@@ -1948,7 +1948,7 @@
           <a:p>
             <a:fld id="{898F3E3B-34E3-4345-B2A1-994B83598A9C}" type="datetimeFigureOut">
               <a:rPr lang="en-US" dirty="0"/>
-              <a:t>5/18/2023</a:t>
+              <a:t>5/19/2023</a:t>
             </a:fld>
             <a:endParaRPr lang="en-US" dirty="0"/>
           </a:p>
@@ -2061,7 +2061,7 @@
           <a:p>
             <a:fld id="{FD816C96-82A1-4D77-8ADA-627AC6FE3D65}" type="datetimeFigureOut">
               <a:rPr lang="en-US" dirty="0"/>
-              <a:t>5/18/2023</a:t>
+              <a:t>5/19/2023</a:t>
             </a:fld>
             <a:endParaRPr lang="en-US" dirty="0"/>
           </a:p>
@@ -2227,7 +2227,7 @@
           <a:p>
             <a:fld id="{1D102C1E-28F2-47E9-802D-339E64E2F920}" type="datetimeFigureOut">
               <a:rPr lang="en-US" dirty="0"/>
-              <a:t>5/18/2023</a:t>
+              <a:t>5/19/2023</a:t>
             </a:fld>
             <a:endParaRPr lang="en-US" dirty="0"/>
           </a:p>
@@ -2577,7 +2577,7 @@
           <a:p>
             <a:fld id="{24271A48-F18A-45B3-BC05-1E27DA3F88AF}" type="datetimeFigureOut">
               <a:rPr lang="en-US" dirty="0"/>
-              <a:t>5/18/2023</a:t>
+              <a:t>5/19/2023</a:t>
             </a:fld>
             <a:endParaRPr lang="en-US" dirty="0"/>
           </a:p>
@@ -2950,7 +2950,7 @@
           <a:p>
             <a:fld id="{65B747F8-9654-4282-85D2-65F41AAE7A75}" type="datetimeFigureOut">
               <a:rPr lang="en-US" dirty="0"/>
-              <a:t>5/18/2023</a:t>
+              <a:t>5/19/2023</a:t>
             </a:fld>
             <a:endParaRPr lang="en-US" dirty="0"/>
           </a:p>
@@ -3232,7 +3232,7 @@
           <a:p>
             <a:fld id="{5DC5B261-8843-42D1-AAFC-05E20E2D9B97}" type="datetimeFigureOut">
               <a:rPr lang="en-US" dirty="0"/>
-              <a:t>5/18/2023</a:t>
+              <a:t>5/19/2023</a:t>
             </a:fld>
             <a:endParaRPr lang="en-US" dirty="0"/>
           </a:p>
@@ -3965,6 +3965,262 @@
           </a:p>
         </p:txBody>
       </p:sp>
+      <p:sp>
+        <p:nvSpPr>
+          <p:cNvPr id="3" name="TextBox 2">
+            <a:extLst>
+              <a:ext uri="{FF2B5EF4-FFF2-40B4-BE49-F238E27FC236}">
+                <a16:creationId xmlns:a16="http://schemas.microsoft.com/office/drawing/2014/main" id="{D72F944C-E75D-5840-8660-6557FF5060EF}"/>
+              </a:ext>
+            </a:extLst>
+          </p:cNvPr>
+          <p:cNvSpPr txBox="1"/>
+          <p:nvPr/>
+        </p:nvSpPr>
+        <p:spPr>
+          <a:xfrm>
+            <a:off x="335560" y="1012722"/>
+            <a:ext cx="11568418" cy="5355312"/>
+          </a:xfrm>
+          <a:prstGeom prst="rect">
+            <a:avLst/>
+          </a:prstGeom>
+          <a:noFill/>
+        </p:spPr>
+        <p:txBody>
+          <a:bodyPr wrap="square" rtlCol="0">
+            <a:spAutoFit/>
+          </a:bodyPr>
+          <a:lstStyle/>
+          <a:p>
+            <a:pPr marL="285750" indent="-285750">
+              <a:buFont typeface="Arial" panose="020B0604020202020204" pitchFamily="34" charset="0"/>
+              <a:buChar char="•"/>
+            </a:pPr>
+            <a:r>
+              <a:rPr lang="en-US" dirty="0"/>
+              <a:t>Docker </a:t>
+            </a:r>
+          </a:p>
+          <a:p>
+            <a:pPr marL="742950" lvl="1" indent="-285750">
+              <a:buFont typeface="Arial" panose="020B0604020202020204" pitchFamily="34" charset="0"/>
+              <a:buChar char="•"/>
+            </a:pPr>
+            <a:r>
+              <a:rPr lang="en-US" dirty="0"/>
+              <a:t>docker-compose</a:t>
+            </a:r>
+          </a:p>
+          <a:p>
+            <a:pPr marL="742950" lvl="1" indent="-285750">
+              <a:buFont typeface="Arial" panose="020B0604020202020204" pitchFamily="34" charset="0"/>
+              <a:buChar char="•"/>
+            </a:pPr>
+            <a:r>
+              <a:rPr lang="en-US" dirty="0"/>
+              <a:t>custom service health check</a:t>
+            </a:r>
+          </a:p>
+          <a:p>
+            <a:pPr marL="742950" lvl="1" indent="-285750">
+              <a:buFont typeface="Arial" panose="020B0604020202020204" pitchFamily="34" charset="0"/>
+              <a:buChar char="•"/>
+            </a:pPr>
+            <a:r>
+              <a:rPr lang="en-US" dirty="0"/>
+              <a:t>service tools containers</a:t>
+            </a:r>
+          </a:p>
+          <a:p>
+            <a:pPr marL="285750" indent="-285750">
+              <a:buFont typeface="Arial" panose="020B0604020202020204" pitchFamily="34" charset="0"/>
+              <a:buChar char="•"/>
+            </a:pPr>
+            <a:r>
+              <a:rPr lang="en-US" dirty="0" err="1"/>
+              <a:t>ResourceBundle</a:t>
+            </a:r>
+            <a:r>
+              <a:rPr lang="en-US" dirty="0"/>
+              <a:t> with two language for</a:t>
+            </a:r>
+          </a:p>
+          <a:p>
+            <a:pPr marL="742950" lvl="1" indent="-285750">
+              <a:buFont typeface="Arial" panose="020B0604020202020204" pitchFamily="34" charset="0"/>
+              <a:buChar char="•"/>
+            </a:pPr>
+            <a:r>
+              <a:rPr lang="en-US" dirty="0"/>
+              <a:t>templates</a:t>
+            </a:r>
+          </a:p>
+          <a:p>
+            <a:pPr marL="742950" lvl="1" indent="-285750">
+              <a:buFont typeface="Arial" panose="020B0604020202020204" pitchFamily="34" charset="0"/>
+              <a:buChar char="•"/>
+            </a:pPr>
+            <a:r>
+              <a:rPr lang="en-US" dirty="0"/>
+              <a:t>validators messages </a:t>
+            </a:r>
+          </a:p>
+          <a:p>
+            <a:pPr marL="742950" lvl="1" indent="-285750">
+              <a:buFont typeface="Arial" panose="020B0604020202020204" pitchFamily="34" charset="0"/>
+              <a:buChar char="•"/>
+            </a:pPr>
+            <a:r>
+              <a:rPr lang="en-US" dirty="0"/>
+              <a:t>classes</a:t>
+            </a:r>
+          </a:p>
+          <a:p>
+            <a:pPr marL="285750" indent="-285750">
+              <a:buFont typeface="Arial" panose="020B0604020202020204" pitchFamily="34" charset="0"/>
+              <a:buChar char="•"/>
+            </a:pPr>
+            <a:r>
+              <a:rPr lang="en-US" dirty="0"/>
+              <a:t>Custom DTO validators</a:t>
+            </a:r>
+          </a:p>
+          <a:p>
+            <a:pPr marL="285750" indent="-285750">
+              <a:buFont typeface="Arial" panose="020B0604020202020204" pitchFamily="34" charset="0"/>
+              <a:buChar char="•"/>
+            </a:pPr>
+            <a:r>
+              <a:rPr lang="en-US" dirty="0" err="1"/>
+              <a:t>LiquiBase</a:t>
+            </a:r>
+            <a:r>
+              <a:rPr lang="en-US" dirty="0"/>
+              <a:t> for creating tables, indexes and inserting base data</a:t>
+            </a:r>
+          </a:p>
+          <a:p>
+            <a:pPr marL="285750" indent="-285750">
+              <a:buFont typeface="Arial" panose="020B0604020202020204" pitchFamily="34" charset="0"/>
+              <a:buChar char="•"/>
+            </a:pPr>
+            <a:r>
+              <a:rPr lang="en-US" dirty="0"/>
+              <a:t>Actuator with </a:t>
+            </a:r>
+          </a:p>
+          <a:p>
+            <a:pPr marL="742950" lvl="1" indent="-285750">
+              <a:buFont typeface="Arial" panose="020B0604020202020204" pitchFamily="34" charset="0"/>
+              <a:buChar char="•"/>
+            </a:pPr>
+            <a:r>
+              <a:rPr lang="en-US" dirty="0"/>
+              <a:t>custom </a:t>
+            </a:r>
+            <a:r>
+              <a:rPr lang="en-US" dirty="0" err="1"/>
+              <a:t>HealthIndicator</a:t>
+            </a:r>
+            <a:r>
+              <a:rPr lang="en-US" dirty="0"/>
+              <a:t> </a:t>
+            </a:r>
+          </a:p>
+          <a:p>
+            <a:pPr marL="742950" lvl="1" indent="-285750">
+              <a:buFont typeface="Arial" panose="020B0604020202020204" pitchFamily="34" charset="0"/>
+              <a:buChar char="•"/>
+            </a:pPr>
+            <a:r>
+              <a:rPr lang="en-US" dirty="0"/>
+              <a:t>custom Metric</a:t>
+            </a:r>
+          </a:p>
+          <a:p>
+            <a:pPr marL="285750" indent="-285750">
+              <a:buFont typeface="Arial" panose="020B0604020202020204" pitchFamily="34" charset="0"/>
+              <a:buChar char="•"/>
+            </a:pPr>
+            <a:r>
+              <a:rPr lang="en-US" dirty="0" err="1"/>
+              <a:t>SpringBootAdmin</a:t>
+            </a:r>
+            <a:r>
+              <a:rPr lang="en-US" dirty="0"/>
+              <a:t> for represent info from Actuator</a:t>
+            </a:r>
+          </a:p>
+          <a:p>
+            <a:pPr marL="285750" indent="-285750">
+              <a:buFont typeface="Arial" panose="020B0604020202020204" pitchFamily="34" charset="0"/>
+              <a:buChar char="•"/>
+            </a:pPr>
+            <a:r>
+              <a:rPr lang="en-US" dirty="0" err="1"/>
+              <a:t>EndToEnd</a:t>
+            </a:r>
+            <a:r>
+              <a:rPr lang="en-US" dirty="0"/>
+              <a:t> tests with </a:t>
+            </a:r>
+            <a:r>
+              <a:rPr lang="en-US" dirty="0" err="1"/>
+              <a:t>SpringBootTest</a:t>
+            </a:r>
+            <a:r>
+              <a:rPr lang="en-US" dirty="0"/>
+              <a:t> + </a:t>
+            </a:r>
+            <a:r>
+              <a:rPr lang="en-US" dirty="0" err="1"/>
+              <a:t>MockMVC</a:t>
+            </a:r>
+            <a:endParaRPr lang="en-US" dirty="0"/>
+          </a:p>
+          <a:p>
+            <a:pPr marL="285750" indent="-285750">
+              <a:buFont typeface="Arial" panose="020B0604020202020204" pitchFamily="34" charset="0"/>
+              <a:buChar char="•"/>
+            </a:pPr>
+            <a:r>
+              <a:rPr lang="en-US" dirty="0"/>
+              <a:t>REST Client for getting info and image from external resource</a:t>
+            </a:r>
+          </a:p>
+          <a:p>
+            <a:pPr marL="285750" indent="-285750">
+              <a:buFont typeface="Arial" panose="020B0604020202020204" pitchFamily="34" charset="0"/>
+              <a:buChar char="•"/>
+            </a:pPr>
+            <a:r>
+              <a:rPr lang="en-US" dirty="0"/>
+              <a:t>REST service with Swagger</a:t>
+            </a:r>
+          </a:p>
+          <a:p>
+            <a:pPr marL="285750" indent="-285750">
+              <a:buFont typeface="Arial" panose="020B0604020202020204" pitchFamily="34" charset="0"/>
+              <a:buChar char="•"/>
+            </a:pPr>
+            <a:r>
+              <a:rPr lang="en-US" dirty="0"/>
+              <a:t>Custom environment options and property holder</a:t>
+            </a:r>
+          </a:p>
+          <a:p>
+            <a:pPr marL="285750" indent="-285750">
+              <a:buFont typeface="Arial" panose="020B0604020202020204" pitchFamily="34" charset="0"/>
+              <a:buChar char="•"/>
+            </a:pPr>
+            <a:r>
+              <a:rPr lang="en-US" dirty="0"/>
+              <a:t>User and Session state listener (success/failure login and logout / session expired)</a:t>
+            </a:r>
+          </a:p>
+        </p:txBody>
+      </p:sp>
     </p:spTree>
     <p:extLst>
       <p:ext uri="{BB962C8B-B14F-4D97-AF65-F5344CB8AC3E}">

</xml_diff>

<commit_message>
add business functionality to Library.pptx
</commit_message>
<xml_diff>
--- a/Library.pptx
+++ b/Library.pptx
@@ -14,7 +14,8 @@
     <p:sldId id="262" r:id="rId8"/>
     <p:sldId id="263" r:id="rId9"/>
     <p:sldId id="264" r:id="rId10"/>
-    <p:sldId id="265" r:id="rId11"/>
+    <p:sldId id="266" r:id="rId11"/>
+    <p:sldId id="265" r:id="rId12"/>
   </p:sldIdLst>
   <p:sldSz cx="12192000" cy="6858000"/>
   <p:notesSz cx="6858000" cy="9144000"/>
@@ -347,7 +348,7 @@
           <a:p>
             <a:fld id="{5A069CB8-F204-4D06-B913-C5A26A89888A}" type="datetimeFigureOut">
               <a:rPr lang="en-US" dirty="0"/>
-              <a:t>5/19/2023</a:t>
+              <a:t>5/24/2023</a:t>
             </a:fld>
             <a:endParaRPr lang="en-US" dirty="0"/>
           </a:p>
@@ -550,7 +551,7 @@
           <a:p>
             <a:fld id="{50B6E300-0A13-4A81-945A-7333C271A069}" type="datetimeFigureOut">
               <a:rPr lang="en-US" dirty="0"/>
-              <a:t>5/19/2023</a:t>
+              <a:t>5/24/2023</a:t>
             </a:fld>
             <a:endParaRPr lang="en-US" dirty="0"/>
           </a:p>
@@ -801,7 +802,7 @@
           <a:p>
             <a:fld id="{34671962-1EA4-46E7-BCB0-F36CE46D1A59}" type="datetimeFigureOut">
               <a:rPr lang="en-US" dirty="0"/>
-              <a:t>5/19/2023</a:t>
+              <a:t>5/24/2023</a:t>
             </a:fld>
             <a:endParaRPr lang="en-US" dirty="0"/>
           </a:p>
@@ -966,7 +967,7 @@
           <a:p>
             <a:fld id="{D30BB376-B19C-488D-ABEB-03C7E6E9E3E0}" type="datetimeFigureOut">
               <a:rPr lang="en-US" dirty="0"/>
-              <a:t>5/19/2023</a:t>
+              <a:t>5/24/2023</a:t>
             </a:fld>
             <a:endParaRPr lang="en-US" dirty="0"/>
           </a:p>
@@ -1304,7 +1305,7 @@
           <a:p>
             <a:fld id="{486F077B-A50F-4D64-8574-E2D6A98A5553}" type="datetimeFigureOut">
               <a:rPr lang="en-US" dirty="0"/>
-              <a:t>5/19/2023</a:t>
+              <a:t>5/24/2023</a:t>
             </a:fld>
             <a:endParaRPr lang="en-US" dirty="0"/>
           </a:p>
@@ -1574,7 +1575,7 @@
           <a:p>
             <a:fld id="{7D9E2A62-1983-43A1-A163-D8AA46534C80}" type="datetimeFigureOut">
               <a:rPr lang="en-US" dirty="0"/>
-              <a:t>5/19/2023</a:t>
+              <a:t>5/24/2023</a:t>
             </a:fld>
             <a:endParaRPr lang="en-US" dirty="0"/>
           </a:p>
@@ -1948,7 +1949,7 @@
           <a:p>
             <a:fld id="{898F3E3B-34E3-4345-B2A1-994B83598A9C}" type="datetimeFigureOut">
               <a:rPr lang="en-US" dirty="0"/>
-              <a:t>5/19/2023</a:t>
+              <a:t>5/24/2023</a:t>
             </a:fld>
             <a:endParaRPr lang="en-US" dirty="0"/>
           </a:p>
@@ -2061,7 +2062,7 @@
           <a:p>
             <a:fld id="{FD816C96-82A1-4D77-8ADA-627AC6FE3D65}" type="datetimeFigureOut">
               <a:rPr lang="en-US" dirty="0"/>
-              <a:t>5/19/2023</a:t>
+              <a:t>5/24/2023</a:t>
             </a:fld>
             <a:endParaRPr lang="en-US" dirty="0"/>
           </a:p>
@@ -2227,7 +2228,7 @@
           <a:p>
             <a:fld id="{1D102C1E-28F2-47E9-802D-339E64E2F920}" type="datetimeFigureOut">
               <a:rPr lang="en-US" dirty="0"/>
-              <a:t>5/19/2023</a:t>
+              <a:t>5/24/2023</a:t>
             </a:fld>
             <a:endParaRPr lang="en-US" dirty="0"/>
           </a:p>
@@ -2577,7 +2578,7 @@
           <a:p>
             <a:fld id="{24271A48-F18A-45B3-BC05-1E27DA3F88AF}" type="datetimeFigureOut">
               <a:rPr lang="en-US" dirty="0"/>
-              <a:t>5/19/2023</a:t>
+              <a:t>5/24/2023</a:t>
             </a:fld>
             <a:endParaRPr lang="en-US" dirty="0"/>
           </a:p>
@@ -2950,7 +2951,7 @@
           <a:p>
             <a:fld id="{65B747F8-9654-4282-85D2-65F41AAE7A75}" type="datetimeFigureOut">
               <a:rPr lang="en-US" dirty="0"/>
-              <a:t>5/19/2023</a:t>
+              <a:t>5/24/2023</a:t>
             </a:fld>
             <a:endParaRPr lang="en-US" dirty="0"/>
           </a:p>
@@ -3232,7 +3233,7 @@
           <a:p>
             <a:fld id="{5DC5B261-8843-42D1-AAFC-05E20E2D9B97}" type="datetimeFigureOut">
               <a:rPr lang="en-US" dirty="0"/>
-              <a:t>5/19/2023</a:t>
+              <a:t>5/24/2023</a:t>
             </a:fld>
             <a:endParaRPr lang="en-US" dirty="0"/>
           </a:p>
@@ -3877,7 +3878,7 @@
         </p:nvSpPr>
         <p:spPr>
           <a:xfrm>
-            <a:off x="1124125" y="2908883"/>
+            <a:off x="1097280" y="3050854"/>
             <a:ext cx="4849661" cy="369332"/>
           </a:xfrm>
           <a:prstGeom prst="rect">
@@ -3894,6 +3895,42 @@
             <a:r>
               <a:rPr lang="pl-PL" dirty="0"/>
               <a:t>https://github.com/benzol45/EPAM_final_project</a:t>
+            </a:r>
+            <a:endParaRPr lang="ru-RU" dirty="0"/>
+          </a:p>
+        </p:txBody>
+      </p:sp>
+      <p:sp>
+        <p:nvSpPr>
+          <p:cNvPr id="4" name="TextBox 3">
+            <a:extLst>
+              <a:ext uri="{FF2B5EF4-FFF2-40B4-BE49-F238E27FC236}">
+                <a16:creationId xmlns:a16="http://schemas.microsoft.com/office/drawing/2014/main" id="{8D32B0AB-B761-A258-AD3E-7342B14B4D28}"/>
+              </a:ext>
+            </a:extLst>
+          </p:cNvPr>
+          <p:cNvSpPr txBox="1"/>
+          <p:nvPr/>
+        </p:nvSpPr>
+        <p:spPr>
+          <a:xfrm>
+            <a:off x="1097280" y="3316779"/>
+            <a:ext cx="6429389" cy="369332"/>
+          </a:xfrm>
+          <a:prstGeom prst="rect">
+            <a:avLst/>
+          </a:prstGeom>
+          <a:noFill/>
+        </p:spPr>
+        <p:txBody>
+          <a:bodyPr wrap="none" rtlCol="0">
+            <a:spAutoFit/>
+          </a:bodyPr>
+          <a:lstStyle/>
+          <a:p>
+            <a:r>
+              <a:rPr lang="pl-PL" dirty="0"/>
+              <a:t>http://epam-final-project-library.westeurope.cloudapp.azure.com/</a:t>
             </a:r>
             <a:endParaRPr lang="ru-RU" dirty="0"/>
           </a:p>
@@ -3913,6 +3950,140 @@
 </file>
 
 <file path=ppt/slides/slide10.xml><?xml version="1.0" encoding="utf-8"?>
+<p:sld xmlns:a="http://schemas.openxmlformats.org/drawingml/2006/main" xmlns:r="http://schemas.openxmlformats.org/officeDocument/2006/relationships" xmlns:p="http://schemas.openxmlformats.org/presentationml/2006/main">
+  <p:cSld>
+    <p:spTree>
+      <p:nvGrpSpPr>
+        <p:cNvPr id="1" name=""/>
+        <p:cNvGrpSpPr/>
+        <p:nvPr/>
+      </p:nvGrpSpPr>
+      <p:grpSpPr>
+        <a:xfrm>
+          <a:off x="0" y="0"/>
+          <a:ext cx="0" cy="0"/>
+          <a:chOff x="0" y="0"/>
+          <a:chExt cx="0" cy="0"/>
+        </a:xfrm>
+      </p:grpSpPr>
+      <p:sp>
+        <p:nvSpPr>
+          <p:cNvPr id="2" name="TextBox 1">
+            <a:extLst>
+              <a:ext uri="{FF2B5EF4-FFF2-40B4-BE49-F238E27FC236}">
+                <a16:creationId xmlns:a16="http://schemas.microsoft.com/office/drawing/2014/main" id="{7FAB1A7F-1F52-5E30-7A8D-E8538279D410}"/>
+              </a:ext>
+            </a:extLst>
+          </p:cNvPr>
+          <p:cNvSpPr txBox="1"/>
+          <p:nvPr/>
+        </p:nvSpPr>
+        <p:spPr>
+          <a:xfrm>
+            <a:off x="335560" y="243281"/>
+            <a:ext cx="7661072" cy="769441"/>
+          </a:xfrm>
+          <a:prstGeom prst="rect">
+            <a:avLst/>
+          </a:prstGeom>
+          <a:noFill/>
+        </p:spPr>
+        <p:txBody>
+          <a:bodyPr wrap="none" rtlCol="0">
+            <a:spAutoFit/>
+          </a:bodyPr>
+          <a:lstStyle/>
+          <a:p>
+            <a:r>
+              <a:rPr lang="en-US" sz="4400" dirty="0"/>
+              <a:t>Additional business functionality</a:t>
+            </a:r>
+            <a:endParaRPr lang="ru-RU" sz="4400" dirty="0"/>
+          </a:p>
+        </p:txBody>
+      </p:sp>
+      <p:sp>
+        <p:nvSpPr>
+          <p:cNvPr id="3" name="TextBox 2">
+            <a:extLst>
+              <a:ext uri="{FF2B5EF4-FFF2-40B4-BE49-F238E27FC236}">
+                <a16:creationId xmlns:a16="http://schemas.microsoft.com/office/drawing/2014/main" id="{D72F944C-E75D-5840-8660-6557FF5060EF}"/>
+              </a:ext>
+            </a:extLst>
+          </p:cNvPr>
+          <p:cNvSpPr txBox="1"/>
+          <p:nvPr/>
+        </p:nvSpPr>
+        <p:spPr>
+          <a:xfrm>
+            <a:off x="335560" y="1012722"/>
+            <a:ext cx="11568418" cy="1676741"/>
+          </a:xfrm>
+          <a:prstGeom prst="rect">
+            <a:avLst/>
+          </a:prstGeom>
+          <a:noFill/>
+        </p:spPr>
+        <p:txBody>
+          <a:bodyPr wrap="square" rtlCol="0">
+            <a:spAutoFit/>
+          </a:bodyPr>
+          <a:lstStyle/>
+          <a:p>
+            <a:pPr marL="285750" indent="-285750">
+              <a:lnSpc>
+                <a:spcPct val="200000"/>
+              </a:lnSpc>
+              <a:buFont typeface="Arial" panose="020B0604020202020204" pitchFamily="34" charset="0"/>
+              <a:buChar char="•"/>
+            </a:pPr>
+            <a:r>
+              <a:rPr lang="en-US" dirty="0"/>
+              <a:t>Filling book information from ISBN database (openlibrary.org) with cover image.</a:t>
+            </a:r>
+          </a:p>
+          <a:p>
+            <a:pPr marL="285750" indent="-285750">
+              <a:lnSpc>
+                <a:spcPct val="200000"/>
+              </a:lnSpc>
+              <a:buFont typeface="Arial" panose="020B0604020202020204" pitchFamily="34" charset="0"/>
+              <a:buChar char="•"/>
+            </a:pPr>
+            <a:r>
+              <a:rPr lang="en-US" dirty="0"/>
+              <a:t>Base statistical subsystem</a:t>
+            </a:r>
+          </a:p>
+          <a:p>
+            <a:pPr marL="285750" indent="-285750">
+              <a:lnSpc>
+                <a:spcPct val="200000"/>
+              </a:lnSpc>
+              <a:buFont typeface="Arial" panose="020B0604020202020204" pitchFamily="34" charset="0"/>
+              <a:buChar char="•"/>
+            </a:pPr>
+            <a:r>
+              <a:rPr lang="en-US" dirty="0"/>
+              <a:t>Book rating (after returning reader can set rate for a book) with sorting books by rating</a:t>
+            </a:r>
+          </a:p>
+        </p:txBody>
+      </p:sp>
+    </p:spTree>
+    <p:extLst>
+      <p:ext uri="{BB962C8B-B14F-4D97-AF65-F5344CB8AC3E}">
+        <p14:creationId xmlns:p14="http://schemas.microsoft.com/office/powerpoint/2010/main" val="2266840578"/>
+      </p:ext>
+    </p:extLst>
+  </p:cSld>
+  <p:clrMapOvr>
+    <a:masterClrMapping/>
+  </p:clrMapOvr>
+</p:sld>
+</file>
+
+<file path=ppt/slides/slide11.xml><?xml version="1.0" encoding="utf-8"?>
 <p:sld xmlns:a="http://schemas.openxmlformats.org/drawingml/2006/main" xmlns:r="http://schemas.openxmlformats.org/officeDocument/2006/relationships" xmlns:p="http://schemas.openxmlformats.org/presentationml/2006/main">
   <p:cSld>
     <p:spTree>

</xml_diff>